<commit_message>
something I did some time ago and forgot to commit
</commit_message>
<xml_diff>
--- a/FSharp2.pptx
+++ b/FSharp2.pptx
@@ -6,10 +6,10 @@
     <p:sldMasterId id="2147483660" r:id="rId2"/>
   </p:sldMasterIdLst>
   <p:notesMasterIdLst>
-    <p:notesMasterId r:id="rId15"/>
+    <p:notesMasterId r:id="rId17"/>
   </p:notesMasterIdLst>
   <p:handoutMasterIdLst>
-    <p:handoutMasterId r:id="rId16"/>
+    <p:handoutMasterId r:id="rId18"/>
   </p:handoutMasterIdLst>
   <p:sldIdLst>
     <p:sldId id="256" r:id="rId3"/>
@@ -24,6 +24,8 @@
     <p:sldId id="264" r:id="rId12"/>
     <p:sldId id="265" r:id="rId13"/>
     <p:sldId id="266" r:id="rId14"/>
+    <p:sldId id="269" r:id="rId15"/>
+    <p:sldId id="270" r:id="rId16"/>
   </p:sldIdLst>
   <p:sldSz cx="9144000" cy="6858000" type="screen4x3"/>
   <p:notesSz cx="6858000" cy="9144000"/>
@@ -8327,6 +8329,810 @@
 </p:sld>
 </file>
 
+<file path=ppt/slides/slide13.xml><?xml version="1.0" encoding="utf-8"?>
+<p:sld xmlns:a="http://schemas.openxmlformats.org/drawingml/2006/main" xmlns:r="http://schemas.openxmlformats.org/officeDocument/2006/relationships" xmlns:p="http://schemas.openxmlformats.org/presentationml/2006/main">
+  <p:cSld>
+    <p:spTree>
+      <p:nvGrpSpPr>
+        <p:cNvPr id="1" name=""/>
+        <p:cNvGrpSpPr/>
+        <p:nvPr/>
+      </p:nvGrpSpPr>
+      <p:grpSpPr>
+        <a:xfrm>
+          <a:off x="0" y="0"/>
+          <a:ext cx="0" cy="0"/>
+          <a:chOff x="0" y="0"/>
+          <a:chExt cx="0" cy="0"/>
+        </a:xfrm>
+      </p:grpSpPr>
+      <p:sp>
+        <p:nvSpPr>
+          <p:cNvPr id="2" name="Title 1"/>
+          <p:cNvSpPr>
+            <a:spLocks noGrp="1"/>
+          </p:cNvSpPr>
+          <p:nvPr>
+            <p:ph type="title"/>
+          </p:nvPr>
+        </p:nvSpPr>
+        <p:spPr/>
+        <p:txBody>
+          <a:bodyPr/>
+          <a:lstStyle/>
+          <a:p>
+            <a:pPr>
+              <a:buNone/>
+            </a:pPr>
+            <a:r>
+              <a:rPr lang="sv-SE" dirty="0" smtClean="0"/>
+              <a:t>Functions</a:t>
+            </a:r>
+            <a:endParaRPr lang="sv-SE" dirty="0"/>
+          </a:p>
+        </p:txBody>
+      </p:sp>
+      <p:sp>
+        <p:nvSpPr>
+          <p:cNvPr id="3" name="Content Placeholder 2"/>
+          <p:cNvSpPr>
+            <a:spLocks noGrp="1"/>
+          </p:cNvSpPr>
+          <p:nvPr>
+            <p:ph idx="1"/>
+          </p:nvPr>
+        </p:nvSpPr>
+        <p:spPr>
+          <a:xfrm>
+            <a:off x="457200" y="1604520"/>
+            <a:ext cx="8507288" cy="4525920"/>
+          </a:xfrm>
+        </p:spPr>
+        <p:txBody>
+          <a:bodyPr/>
+          <a:lstStyle/>
+          <a:p>
+            <a:pPr marL="108000" indent="0">
+              <a:buNone/>
+            </a:pPr>
+            <a:r>
+              <a:rPr lang="es-ES" dirty="0" smtClean="0">
+                <a:solidFill>
+                  <a:srgbClr val="0000FF"/>
+                </a:solidFill>
+                <a:latin typeface="Consolas"/>
+              </a:rPr>
+              <a:t>No (, ) </a:t>
+            </a:r>
+            <a:r>
+              <a:rPr lang="es-ES" dirty="0" err="1" smtClean="0">
+                <a:solidFill>
+                  <a:srgbClr val="0000FF"/>
+                </a:solidFill>
+                <a:latin typeface="Consolas"/>
+              </a:rPr>
+              <a:t>or</a:t>
+            </a:r>
+            <a:r>
+              <a:rPr lang="es-ES" dirty="0" smtClean="0">
+                <a:solidFill>
+                  <a:srgbClr val="0000FF"/>
+                </a:solidFill>
+                <a:latin typeface="Consolas"/>
+              </a:rPr>
+              <a:t> ,.</a:t>
+            </a:r>
+          </a:p>
+          <a:p>
+            <a:pPr marL="108000" indent="0">
+              <a:buNone/>
+            </a:pPr>
+            <a:r>
+              <a:rPr lang="es-ES" dirty="0" err="1" smtClean="0">
+                <a:solidFill>
+                  <a:srgbClr val="0000FF"/>
+                </a:solidFill>
+                <a:latin typeface="Consolas"/>
+              </a:rPr>
+              <a:t>let</a:t>
+            </a:r>
+            <a:r>
+              <a:rPr lang="es-ES" dirty="0" smtClean="0">
+                <a:solidFill>
+                  <a:prstClr val="black"/>
+                </a:solidFill>
+                <a:latin typeface="Consolas"/>
+              </a:rPr>
+              <a:t> </a:t>
+            </a:r>
+            <a:r>
+              <a:rPr lang="es-ES" dirty="0" err="1" smtClean="0">
+                <a:solidFill>
+                  <a:prstClr val="black"/>
+                </a:solidFill>
+                <a:latin typeface="Consolas"/>
+              </a:rPr>
+              <a:t>add</a:t>
+            </a:r>
+            <a:r>
+              <a:rPr lang="es-ES" dirty="0" smtClean="0">
+                <a:solidFill>
+                  <a:prstClr val="black"/>
+                </a:solidFill>
+                <a:latin typeface="Consolas"/>
+              </a:rPr>
+              <a:t> x y = x + y</a:t>
+            </a:r>
+          </a:p>
+          <a:p>
+            <a:pPr marL="108000" indent="0">
+              <a:buNone/>
+            </a:pPr>
+            <a:r>
+              <a:rPr lang="sv-SE" dirty="0" smtClean="0">
+                <a:solidFill>
+                  <a:srgbClr val="0000FF"/>
+                </a:solidFill>
+                <a:latin typeface="Consolas"/>
+              </a:rPr>
+              <a:t>let</a:t>
+            </a:r>
+            <a:r>
+              <a:rPr lang="sv-SE" dirty="0" smtClean="0">
+                <a:solidFill>
+                  <a:prstClr val="black"/>
+                </a:solidFill>
+                <a:latin typeface="Consolas"/>
+              </a:rPr>
+              <a:t> </a:t>
+            </a:r>
+            <a:r>
+              <a:rPr lang="sv-SE" dirty="0">
+                <a:solidFill>
+                  <a:prstClr val="black"/>
+                </a:solidFill>
+                <a:latin typeface="Consolas"/>
+              </a:rPr>
+              <a:t>four = </a:t>
+            </a:r>
+            <a:r>
+              <a:rPr lang="sv-SE" dirty="0" smtClean="0">
+                <a:solidFill>
+                  <a:prstClr val="black"/>
+                </a:solidFill>
+                <a:latin typeface="Consolas"/>
+              </a:rPr>
+              <a:t>add 2 </a:t>
+            </a:r>
+            <a:r>
+              <a:rPr lang="sv-SE" dirty="0">
+                <a:solidFill>
+                  <a:prstClr val="black"/>
+                </a:solidFill>
+                <a:latin typeface="Consolas"/>
+              </a:rPr>
+              <a:t>2</a:t>
+            </a:r>
+          </a:p>
+          <a:p>
+            <a:pPr marL="108000" indent="0">
+              <a:buNone/>
+            </a:pPr>
+            <a:endParaRPr lang="sv-SE" dirty="0">
+              <a:solidFill>
+                <a:prstClr val="black"/>
+              </a:solidFill>
+              <a:latin typeface="Consolas"/>
+            </a:endParaRPr>
+          </a:p>
+          <a:p>
+            <a:pPr marL="108000" indent="0">
+              <a:buNone/>
+            </a:pPr>
+            <a:endParaRPr lang="es-ES" dirty="0" smtClean="0"/>
+          </a:p>
+        </p:txBody>
+      </p:sp>
+    </p:spTree>
+    <p:extLst>
+      <p:ext uri="{BB962C8B-B14F-4D97-AF65-F5344CB8AC3E}">
+        <p14:creationId xmlns:p14="http://schemas.microsoft.com/office/powerpoint/2010/main" val="3826616327"/>
+      </p:ext>
+    </p:extLst>
+  </p:cSld>
+  <p:clrMapOvr>
+    <a:masterClrMapping/>
+  </p:clrMapOvr>
+  <mc:AlternateContent xmlns:mc="http://schemas.openxmlformats.org/markup-compatibility/2006" xmlns:p14="http://schemas.microsoft.com/office/powerpoint/2010/main">
+    <mc:Choice Requires="p14">
+      <p:transition spd="slow" p14:dur="2000"/>
+    </mc:Choice>
+    <mc:Fallback xmlns="">
+      <p:transition spd="slow"/>
+    </mc:Fallback>
+  </mc:AlternateContent>
+  <p:timing>
+    <p:tnLst>
+      <p:par>
+        <p:cTn id="1" dur="indefinite" restart="never" nodeType="tmRoot">
+          <p:childTnLst>
+            <p:seq concurrent="1" nextAc="seek">
+              <p:cTn id="2" dur="indefinite" nodeType="mainSeq">
+                <p:childTnLst>
+                  <p:par>
+                    <p:cTn id="3" fill="hold">
+                      <p:stCondLst>
+                        <p:cond delay="indefinite"/>
+                      </p:stCondLst>
+                      <p:childTnLst>
+                        <p:par>
+                          <p:cTn id="4" fill="hold">
+                            <p:stCondLst>
+                              <p:cond delay="0"/>
+                            </p:stCondLst>
+                            <p:childTnLst>
+                              <p:par>
+                                <p:cTn id="5" presetID="2" presetClass="entr" presetSubtype="4" fill="hold" nodeType="clickEffect">
+                                  <p:stCondLst>
+                                    <p:cond delay="0"/>
+                                  </p:stCondLst>
+                                  <p:childTnLst>
+                                    <p:set>
+                                      <p:cBhvr>
+                                        <p:cTn id="6" dur="1" fill="hold">
+                                          <p:stCondLst>
+                                            <p:cond delay="0"/>
+                                          </p:stCondLst>
+                                        </p:cTn>
+                                        <p:tgtEl>
+                                          <p:spTgt spid="3">
+                                            <p:txEl>
+                                              <p:pRg st="0" end="0"/>
+                                            </p:txEl>
+                                          </p:spTgt>
+                                        </p:tgtEl>
+                                        <p:attrNameLst>
+                                          <p:attrName>style.visibility</p:attrName>
+                                        </p:attrNameLst>
+                                      </p:cBhvr>
+                                      <p:to>
+                                        <p:strVal val="visible"/>
+                                      </p:to>
+                                    </p:set>
+                                    <p:anim calcmode="lin" valueType="num">
+                                      <p:cBhvr additive="base">
+                                        <p:cTn id="7" dur="500" fill="hold"/>
+                                        <p:tgtEl>
+                                          <p:spTgt spid="3">
+                                            <p:txEl>
+                                              <p:pRg st="0" end="0"/>
+                                            </p:txEl>
+                                          </p:spTgt>
+                                        </p:tgtEl>
+                                        <p:attrNameLst>
+                                          <p:attrName>ppt_x</p:attrName>
+                                        </p:attrNameLst>
+                                      </p:cBhvr>
+                                      <p:tavLst>
+                                        <p:tav tm="0">
+                                          <p:val>
+                                            <p:strVal val="#ppt_x"/>
+                                          </p:val>
+                                        </p:tav>
+                                        <p:tav tm="100000">
+                                          <p:val>
+                                            <p:strVal val="#ppt_x"/>
+                                          </p:val>
+                                        </p:tav>
+                                      </p:tavLst>
+                                    </p:anim>
+                                    <p:anim calcmode="lin" valueType="num">
+                                      <p:cBhvr additive="base">
+                                        <p:cTn id="8" dur="500" fill="hold"/>
+                                        <p:tgtEl>
+                                          <p:spTgt spid="3">
+                                            <p:txEl>
+                                              <p:pRg st="0" end="0"/>
+                                            </p:txEl>
+                                          </p:spTgt>
+                                        </p:tgtEl>
+                                        <p:attrNameLst>
+                                          <p:attrName>ppt_y</p:attrName>
+                                        </p:attrNameLst>
+                                      </p:cBhvr>
+                                      <p:tavLst>
+                                        <p:tav tm="0">
+                                          <p:val>
+                                            <p:strVal val="1+#ppt_h/2"/>
+                                          </p:val>
+                                        </p:tav>
+                                        <p:tav tm="100000">
+                                          <p:val>
+                                            <p:strVal val="#ppt_y"/>
+                                          </p:val>
+                                        </p:tav>
+                                      </p:tavLst>
+                                    </p:anim>
+                                  </p:childTnLst>
+                                </p:cTn>
+                              </p:par>
+                              <p:par>
+                                <p:cTn id="9" presetID="2" presetClass="entr" presetSubtype="4" fill="hold" nodeType="withEffect">
+                                  <p:stCondLst>
+                                    <p:cond delay="0"/>
+                                  </p:stCondLst>
+                                  <p:childTnLst>
+                                    <p:set>
+                                      <p:cBhvr>
+                                        <p:cTn id="10" dur="1" fill="hold">
+                                          <p:stCondLst>
+                                            <p:cond delay="0"/>
+                                          </p:stCondLst>
+                                        </p:cTn>
+                                        <p:tgtEl>
+                                          <p:spTgt spid="3">
+                                            <p:txEl>
+                                              <p:pRg st="1" end="1"/>
+                                            </p:txEl>
+                                          </p:spTgt>
+                                        </p:tgtEl>
+                                        <p:attrNameLst>
+                                          <p:attrName>style.visibility</p:attrName>
+                                        </p:attrNameLst>
+                                      </p:cBhvr>
+                                      <p:to>
+                                        <p:strVal val="visible"/>
+                                      </p:to>
+                                    </p:set>
+                                    <p:anim calcmode="lin" valueType="num">
+                                      <p:cBhvr additive="base">
+                                        <p:cTn id="11" dur="500" fill="hold"/>
+                                        <p:tgtEl>
+                                          <p:spTgt spid="3">
+                                            <p:txEl>
+                                              <p:pRg st="1" end="1"/>
+                                            </p:txEl>
+                                          </p:spTgt>
+                                        </p:tgtEl>
+                                        <p:attrNameLst>
+                                          <p:attrName>ppt_x</p:attrName>
+                                        </p:attrNameLst>
+                                      </p:cBhvr>
+                                      <p:tavLst>
+                                        <p:tav tm="0">
+                                          <p:val>
+                                            <p:strVal val="#ppt_x"/>
+                                          </p:val>
+                                        </p:tav>
+                                        <p:tav tm="100000">
+                                          <p:val>
+                                            <p:strVal val="#ppt_x"/>
+                                          </p:val>
+                                        </p:tav>
+                                      </p:tavLst>
+                                    </p:anim>
+                                    <p:anim calcmode="lin" valueType="num">
+                                      <p:cBhvr additive="base">
+                                        <p:cTn id="12" dur="500" fill="hold"/>
+                                        <p:tgtEl>
+                                          <p:spTgt spid="3">
+                                            <p:txEl>
+                                              <p:pRg st="1" end="1"/>
+                                            </p:txEl>
+                                          </p:spTgt>
+                                        </p:tgtEl>
+                                        <p:attrNameLst>
+                                          <p:attrName>ppt_y</p:attrName>
+                                        </p:attrNameLst>
+                                      </p:cBhvr>
+                                      <p:tavLst>
+                                        <p:tav tm="0">
+                                          <p:val>
+                                            <p:strVal val="1+#ppt_h/2"/>
+                                          </p:val>
+                                        </p:tav>
+                                        <p:tav tm="100000">
+                                          <p:val>
+                                            <p:strVal val="#ppt_y"/>
+                                          </p:val>
+                                        </p:tav>
+                                      </p:tavLst>
+                                    </p:anim>
+                                  </p:childTnLst>
+                                </p:cTn>
+                              </p:par>
+                              <p:par>
+                                <p:cTn id="13" presetID="2" presetClass="entr" presetSubtype="4" fill="hold" nodeType="withEffect">
+                                  <p:stCondLst>
+                                    <p:cond delay="0"/>
+                                  </p:stCondLst>
+                                  <p:childTnLst>
+                                    <p:set>
+                                      <p:cBhvr>
+                                        <p:cTn id="14" dur="1" fill="hold">
+                                          <p:stCondLst>
+                                            <p:cond delay="0"/>
+                                          </p:stCondLst>
+                                        </p:cTn>
+                                        <p:tgtEl>
+                                          <p:spTgt spid="3">
+                                            <p:txEl>
+                                              <p:pRg st="2" end="2"/>
+                                            </p:txEl>
+                                          </p:spTgt>
+                                        </p:tgtEl>
+                                        <p:attrNameLst>
+                                          <p:attrName>style.visibility</p:attrName>
+                                        </p:attrNameLst>
+                                      </p:cBhvr>
+                                      <p:to>
+                                        <p:strVal val="visible"/>
+                                      </p:to>
+                                    </p:set>
+                                    <p:anim calcmode="lin" valueType="num">
+                                      <p:cBhvr additive="base">
+                                        <p:cTn id="15" dur="500" fill="hold"/>
+                                        <p:tgtEl>
+                                          <p:spTgt spid="3">
+                                            <p:txEl>
+                                              <p:pRg st="2" end="2"/>
+                                            </p:txEl>
+                                          </p:spTgt>
+                                        </p:tgtEl>
+                                        <p:attrNameLst>
+                                          <p:attrName>ppt_x</p:attrName>
+                                        </p:attrNameLst>
+                                      </p:cBhvr>
+                                      <p:tavLst>
+                                        <p:tav tm="0">
+                                          <p:val>
+                                            <p:strVal val="#ppt_x"/>
+                                          </p:val>
+                                        </p:tav>
+                                        <p:tav tm="100000">
+                                          <p:val>
+                                            <p:strVal val="#ppt_x"/>
+                                          </p:val>
+                                        </p:tav>
+                                      </p:tavLst>
+                                    </p:anim>
+                                    <p:anim calcmode="lin" valueType="num">
+                                      <p:cBhvr additive="base">
+                                        <p:cTn id="16" dur="500" fill="hold"/>
+                                        <p:tgtEl>
+                                          <p:spTgt spid="3">
+                                            <p:txEl>
+                                              <p:pRg st="2" end="2"/>
+                                            </p:txEl>
+                                          </p:spTgt>
+                                        </p:tgtEl>
+                                        <p:attrNameLst>
+                                          <p:attrName>ppt_y</p:attrName>
+                                        </p:attrNameLst>
+                                      </p:cBhvr>
+                                      <p:tavLst>
+                                        <p:tav tm="0">
+                                          <p:val>
+                                            <p:strVal val="1+#ppt_h/2"/>
+                                          </p:val>
+                                        </p:tav>
+                                        <p:tav tm="100000">
+                                          <p:val>
+                                            <p:strVal val="#ppt_y"/>
+                                          </p:val>
+                                        </p:tav>
+                                      </p:tavLst>
+                                    </p:anim>
+                                  </p:childTnLst>
+                                </p:cTn>
+                              </p:par>
+                            </p:childTnLst>
+                          </p:cTn>
+                        </p:par>
+                      </p:childTnLst>
+                    </p:cTn>
+                  </p:par>
+                </p:childTnLst>
+              </p:cTn>
+              <p:prevCondLst>
+                <p:cond evt="onPrev" delay="0">
+                  <p:tgtEl>
+                    <p:sldTgt/>
+                  </p:tgtEl>
+                </p:cond>
+              </p:prevCondLst>
+              <p:nextCondLst>
+                <p:cond evt="onNext" delay="0">
+                  <p:tgtEl>
+                    <p:sldTgt/>
+                  </p:tgtEl>
+                </p:cond>
+              </p:nextCondLst>
+            </p:seq>
+          </p:childTnLst>
+        </p:cTn>
+      </p:par>
+    </p:tnLst>
+  </p:timing>
+</p:sld>
+</file>
+
+<file path=ppt/slides/slide14.xml><?xml version="1.0" encoding="utf-8"?>
+<p:sld xmlns:a="http://schemas.openxmlformats.org/drawingml/2006/main" xmlns:r="http://schemas.openxmlformats.org/officeDocument/2006/relationships" xmlns:p="http://schemas.openxmlformats.org/presentationml/2006/main">
+  <p:cSld>
+    <p:spTree>
+      <p:nvGrpSpPr>
+        <p:cNvPr id="1" name=""/>
+        <p:cNvGrpSpPr/>
+        <p:nvPr/>
+      </p:nvGrpSpPr>
+      <p:grpSpPr>
+        <a:xfrm>
+          <a:off x="0" y="0"/>
+          <a:ext cx="0" cy="0"/>
+          <a:chOff x="0" y="0"/>
+          <a:chExt cx="0" cy="0"/>
+        </a:xfrm>
+      </p:grpSpPr>
+      <p:sp>
+        <p:nvSpPr>
+          <p:cNvPr id="2" name="Title 1"/>
+          <p:cNvSpPr>
+            <a:spLocks noGrp="1"/>
+          </p:cNvSpPr>
+          <p:nvPr>
+            <p:ph type="title"/>
+          </p:nvPr>
+        </p:nvSpPr>
+        <p:spPr/>
+        <p:txBody>
+          <a:bodyPr/>
+          <a:lstStyle/>
+          <a:p>
+            <a:pPr>
+              <a:buNone/>
+            </a:pPr>
+            <a:r>
+              <a:rPr lang="sv-SE" dirty="0" smtClean="0"/>
+              <a:t>Partial application</a:t>
+            </a:r>
+            <a:endParaRPr lang="sv-SE" dirty="0"/>
+          </a:p>
+        </p:txBody>
+      </p:sp>
+      <p:sp>
+        <p:nvSpPr>
+          <p:cNvPr id="3" name="Content Placeholder 2"/>
+          <p:cNvSpPr>
+            <a:spLocks noGrp="1"/>
+          </p:cNvSpPr>
+          <p:nvPr>
+            <p:ph idx="1"/>
+          </p:nvPr>
+        </p:nvSpPr>
+        <p:spPr>
+          <a:xfrm>
+            <a:off x="323528" y="1556792"/>
+            <a:ext cx="8568952" cy="4525920"/>
+          </a:xfrm>
+        </p:spPr>
+        <p:txBody>
+          <a:bodyPr/>
+          <a:lstStyle/>
+          <a:p>
+            <a:pPr marL="108000" indent="0">
+              <a:buNone/>
+            </a:pPr>
+            <a:r>
+              <a:rPr lang="es-ES" dirty="0" err="1">
+                <a:solidFill>
+                  <a:srgbClr val="0000FF"/>
+                </a:solidFill>
+                <a:latin typeface="Consolas"/>
+              </a:rPr>
+              <a:t>let</a:t>
+            </a:r>
+            <a:r>
+              <a:rPr lang="es-ES" dirty="0">
+                <a:solidFill>
+                  <a:prstClr val="black"/>
+                </a:solidFill>
+                <a:latin typeface="Consolas"/>
+              </a:rPr>
+              <a:t> </a:t>
+            </a:r>
+            <a:r>
+              <a:rPr lang="es-ES" dirty="0" err="1">
+                <a:solidFill>
+                  <a:prstClr val="black"/>
+                </a:solidFill>
+                <a:latin typeface="Consolas"/>
+              </a:rPr>
+              <a:t>add</a:t>
+            </a:r>
+            <a:r>
+              <a:rPr lang="es-ES" dirty="0">
+                <a:solidFill>
+                  <a:prstClr val="black"/>
+                </a:solidFill>
+                <a:latin typeface="Consolas"/>
+              </a:rPr>
+              <a:t> x y = x + </a:t>
+            </a:r>
+            <a:r>
+              <a:rPr lang="es-ES" dirty="0" smtClean="0">
+                <a:solidFill>
+                  <a:prstClr val="black"/>
+                </a:solidFill>
+                <a:latin typeface="Consolas"/>
+              </a:rPr>
+              <a:t>y</a:t>
+            </a:r>
+            <a:endParaRPr lang="es-ES" dirty="0" smtClean="0">
+              <a:solidFill>
+                <a:srgbClr val="0000FF"/>
+              </a:solidFill>
+              <a:latin typeface="Consolas"/>
+            </a:endParaRPr>
+          </a:p>
+          <a:p>
+            <a:pPr marL="108000" indent="0">
+              <a:buNone/>
+            </a:pPr>
+            <a:r>
+              <a:rPr lang="es-ES" dirty="0" err="1" smtClean="0">
+                <a:solidFill>
+                  <a:srgbClr val="0000FF"/>
+                </a:solidFill>
+                <a:latin typeface="Consolas"/>
+              </a:rPr>
+              <a:t>let</a:t>
+            </a:r>
+            <a:r>
+              <a:rPr lang="es-ES" dirty="0" smtClean="0">
+                <a:solidFill>
+                  <a:prstClr val="black"/>
+                </a:solidFill>
+                <a:latin typeface="Consolas"/>
+              </a:rPr>
+              <a:t> </a:t>
+            </a:r>
+            <a:r>
+              <a:rPr lang="es-ES" dirty="0" err="1" smtClean="0">
+                <a:solidFill>
+                  <a:prstClr val="black"/>
+                </a:solidFill>
+                <a:latin typeface="Consolas"/>
+              </a:rPr>
+              <a:t>add</a:t>
+            </a:r>
+            <a:r>
+              <a:rPr lang="es-ES" dirty="0" smtClean="0">
+                <a:solidFill>
+                  <a:prstClr val="black"/>
+                </a:solidFill>
+                <a:latin typeface="Consolas"/>
+              </a:rPr>
+              <a:t> </a:t>
+            </a:r>
+            <a:r>
+              <a:rPr lang="es-ES" dirty="0">
+                <a:solidFill>
+                  <a:prstClr val="black"/>
+                </a:solidFill>
+                <a:latin typeface="Consolas"/>
+              </a:rPr>
+              <a:t>= </a:t>
+            </a:r>
+            <a:r>
+              <a:rPr lang="es-ES" dirty="0" err="1">
+                <a:solidFill>
+                  <a:srgbClr val="0000FF"/>
+                </a:solidFill>
+                <a:latin typeface="Consolas"/>
+              </a:rPr>
+              <a:t>fun</a:t>
+            </a:r>
+            <a:r>
+              <a:rPr lang="es-ES" dirty="0">
+                <a:solidFill>
+                  <a:prstClr val="black"/>
+                </a:solidFill>
+                <a:latin typeface="Consolas"/>
+              </a:rPr>
+              <a:t> x </a:t>
+            </a:r>
+            <a:r>
+              <a:rPr lang="es-ES" dirty="0">
+                <a:solidFill>
+                  <a:srgbClr val="0000FF"/>
+                </a:solidFill>
+                <a:latin typeface="Consolas"/>
+              </a:rPr>
+              <a:t>-&gt;</a:t>
+            </a:r>
+            <a:r>
+              <a:rPr lang="es-ES" dirty="0">
+                <a:solidFill>
+                  <a:prstClr val="black"/>
+                </a:solidFill>
+                <a:latin typeface="Consolas"/>
+              </a:rPr>
+              <a:t> </a:t>
+            </a:r>
+            <a:r>
+              <a:rPr lang="es-ES" dirty="0" err="1">
+                <a:solidFill>
+                  <a:srgbClr val="0000FF"/>
+                </a:solidFill>
+                <a:latin typeface="Consolas"/>
+              </a:rPr>
+              <a:t>fun</a:t>
+            </a:r>
+            <a:r>
+              <a:rPr lang="es-ES" dirty="0">
+                <a:solidFill>
+                  <a:prstClr val="black"/>
+                </a:solidFill>
+                <a:latin typeface="Consolas"/>
+              </a:rPr>
+              <a:t> y </a:t>
+            </a:r>
+            <a:r>
+              <a:rPr lang="es-ES" dirty="0">
+                <a:solidFill>
+                  <a:srgbClr val="0000FF"/>
+                </a:solidFill>
+                <a:latin typeface="Consolas"/>
+              </a:rPr>
+              <a:t>-&gt;</a:t>
+            </a:r>
+            <a:r>
+              <a:rPr lang="es-ES" dirty="0">
+                <a:solidFill>
+                  <a:prstClr val="black"/>
+                </a:solidFill>
+                <a:latin typeface="Consolas"/>
+              </a:rPr>
+              <a:t> x + y</a:t>
+            </a:r>
+          </a:p>
+          <a:p>
+            <a:pPr marL="108000" indent="0">
+              <a:buNone/>
+            </a:pPr>
+            <a:endParaRPr lang="sv-SE" dirty="0"/>
+          </a:p>
+        </p:txBody>
+      </p:sp>
+    </p:spTree>
+    <p:extLst>
+      <p:ext uri="{BB962C8B-B14F-4D97-AF65-F5344CB8AC3E}">
+        <p14:creationId xmlns:p14="http://schemas.microsoft.com/office/powerpoint/2010/main" val="2993492193"/>
+      </p:ext>
+    </p:extLst>
+  </p:cSld>
+  <p:clrMapOvr>
+    <a:masterClrMapping/>
+  </p:clrMapOvr>
+  <mc:AlternateContent xmlns:mc="http://schemas.openxmlformats.org/markup-compatibility/2006" xmlns:p14="http://schemas.microsoft.com/office/powerpoint/2010/main">
+    <mc:Choice Requires="p14">
+      <p:transition spd="slow" p14:dur="2000"/>
+    </mc:Choice>
+    <mc:Fallback xmlns="">
+      <p:transition spd="slow"/>
+    </mc:Fallback>
+  </mc:AlternateContent>
+  <p:timing>
+    <p:tnLst>
+      <p:par>
+        <p:cTn id="1" dur="indefinite" restart="never" nodeType="tmRoot"/>
+      </p:par>
+    </p:tnLst>
+  </p:timing>
+</p:sld>
+</file>
+
 <file path=ppt/slides/slide2.xml><?xml version="1.0" encoding="utf-8"?>
 <p:sld xmlns:a="http://schemas.openxmlformats.org/drawingml/2006/main" xmlns:r="http://schemas.openxmlformats.org/officeDocument/2006/relationships" xmlns:p="http://schemas.openxmlformats.org/presentationml/2006/main">
   <p:cSld>
@@ -8376,11 +9182,11 @@
             </a:br>
             <a:r>
               <a:rPr lang="sv-SE" dirty="0" smtClean="0"/>
-              <a:t>What</a:t>
+              <a:t>What vs </a:t>
             </a:r>
             <a:r>
               <a:rPr lang="sv-SE" dirty="0" smtClean="0"/>
-              <a:t>, Not How</a:t>
+              <a:t>How</a:t>
             </a:r>
             <a:endParaRPr lang="sv-SE" dirty="0"/>
           </a:p>

</xml_diff>

<commit_message>
Updated presentation and examples.
</commit_message>
<xml_diff>
--- a/FSharp2.pptx
+++ b/FSharp2.pptx
@@ -6287,11 +6287,7 @@
             <a:pPr lvl="2"/>
             <a:r>
               <a:rPr lang="en-US" dirty="0" smtClean="0"/>
-              <a:t>Unmanageable </a:t>
-            </a:r>
-            <a:r>
-              <a:rPr lang="en-US" dirty="0" smtClean="0"/>
-              <a:t>complexity</a:t>
+              <a:t>Unmanageable complexity</a:t>
             </a:r>
           </a:p>
           <a:p>
@@ -6314,7 +6310,6 @@
               <a:rPr lang="en-US" dirty="0" smtClean="0"/>
               <a:t>Non deterministic behavior</a:t>
             </a:r>
-            <a:endParaRPr lang="en-US" dirty="0" smtClean="0"/>
           </a:p>
         </p:txBody>
       </p:sp>
@@ -6411,26 +6406,14 @@
           <a:p>
             <a:r>
               <a:rPr lang="en-US" dirty="0" smtClean="0"/>
-              <a:t>Partially </a:t>
-            </a:r>
+              <a:t>Partially specified algorithms</a:t>
+            </a:r>
+          </a:p>
+          <a:p>
+            <a:pPr lvl="1"/>
             <a:r>
               <a:rPr lang="en-US" dirty="0" smtClean="0"/>
-              <a:t>specified algorithms</a:t>
-            </a:r>
-          </a:p>
-          <a:p>
-            <a:pPr lvl="1"/>
-            <a:r>
-              <a:rPr lang="en-US" dirty="0" smtClean="0"/>
-              <a:t>Libraries are </a:t>
-            </a:r>
-            <a:r>
-              <a:rPr lang="en-US" dirty="0" smtClean="0"/>
-              <a:t>free to change to multithreaded implementations</a:t>
-            </a:r>
-            <a:r>
-              <a:rPr lang="en-US" dirty="0" smtClean="0"/>
-              <a:t>.</a:t>
+              <a:t>Libraries are free to change to multithreaded implementations.</a:t>
             </a:r>
           </a:p>
           <a:p>
@@ -6730,7 +6713,6 @@
               <a:rPr lang="en-US" sz="2400" dirty="0" smtClean="0"/>
               <a:t>DONE!</a:t>
             </a:r>
-            <a:endParaRPr lang="en-US" sz="2400" dirty="0" smtClean="0"/>
           </a:p>
         </p:txBody>
       </p:sp>
@@ -7447,18 +7429,7 @@
                 <a:ea typeface="DejaVu Sans" pitchFamily="2"/>
                 <a:cs typeface="DejaVu Sans" pitchFamily="2"/>
               </a:rPr>
-              <a:t>All Linq </a:t>
-            </a:r>
-            <a:r>
-              <a:rPr lang="en-US" sz="2000" b="0" i="0" u="none" strike="noStrike" kern="1200" spc="0" dirty="0" smtClean="0">
-                <a:ln>
-                  <a:noFill/>
-                </a:ln>
-                <a:latin typeface="Arial" pitchFamily="18"/>
-                <a:ea typeface="DejaVu Sans" pitchFamily="2"/>
-                <a:cs typeface="DejaVu Sans" pitchFamily="2"/>
-              </a:rPr>
-              <a:t>operators are </a:t>
+              <a:t>All Linq operators are </a:t>
             </a:r>
             <a:r>
               <a:rPr lang="en-US" sz="2000" b="0" i="1" u="none" strike="noStrike" kern="1200" spc="0" dirty="0" smtClean="0">
@@ -7496,18 +7467,7 @@
                 <a:ea typeface="DejaVu Sans" pitchFamily="2"/>
                 <a:cs typeface="DejaVu Sans" pitchFamily="2"/>
               </a:rPr>
-              <a:t>Many </a:t>
-            </a:r>
-            <a:r>
-              <a:rPr lang="en-US" sz="2000" b="0" i="0" u="none" strike="noStrike" kern="1200" spc="0" dirty="0" smtClean="0">
-                <a:ln>
-                  <a:noFill/>
-                </a:ln>
-                <a:latin typeface="Arial" pitchFamily="18"/>
-                <a:ea typeface="DejaVu Sans" pitchFamily="2"/>
-                <a:cs typeface="DejaVu Sans" pitchFamily="2"/>
-              </a:rPr>
-              <a:t>Linq operators are </a:t>
+              <a:t>Many Linq operators are </a:t>
             </a:r>
             <a:r>
               <a:rPr lang="en-US" sz="2000" b="0" i="1" u="none" strike="noStrike" kern="1200" spc="0" dirty="0" smtClean="0">
@@ -7518,18 +7478,7 @@
                 <a:ea typeface="DejaVu Sans" pitchFamily="2"/>
                 <a:cs typeface="DejaVu Sans" pitchFamily="2"/>
               </a:rPr>
-              <a:t>higher order </a:t>
-            </a:r>
-            <a:r>
-              <a:rPr lang="en-US" sz="2000" b="0" i="1" u="none" strike="noStrike" kern="1200" spc="0" dirty="0" smtClean="0">
-                <a:ln>
-                  <a:noFill/>
-                </a:ln>
-                <a:latin typeface="Arial" pitchFamily="18"/>
-                <a:ea typeface="DejaVu Sans" pitchFamily="2"/>
-                <a:cs typeface="DejaVu Sans" pitchFamily="2"/>
-              </a:rPr>
-              <a:t>functions</a:t>
+              <a:t>higher order functions</a:t>
             </a:r>
           </a:p>
           <a:p>
@@ -7556,18 +7505,7 @@
                 <a:ea typeface="DejaVu Sans" pitchFamily="2"/>
                 <a:cs typeface="DejaVu Sans" pitchFamily="2"/>
               </a:rPr>
-              <a:t>Lambdas </a:t>
-            </a:r>
-            <a:r>
-              <a:rPr lang="en-US" sz="2000" b="0" i="0" u="none" strike="noStrike" kern="1200" spc="0" dirty="0" smtClean="0">
-                <a:ln>
-                  <a:noFill/>
-                </a:ln>
-                <a:latin typeface="Arial" pitchFamily="18"/>
-                <a:ea typeface="DejaVu Sans" pitchFamily="2"/>
-                <a:cs typeface="DejaVu Sans" pitchFamily="2"/>
-              </a:rPr>
-              <a:t>are </a:t>
+              <a:t>Lambdas are </a:t>
             </a:r>
             <a:r>
               <a:rPr lang="en-US" sz="2000" b="0" i="1" u="none" strike="noStrike" kern="1200" spc="0" dirty="0" smtClean="0">
@@ -7605,18 +7543,7 @@
                 <a:ea typeface="DejaVu Sans" pitchFamily="2"/>
                 <a:cs typeface="DejaVu Sans" pitchFamily="2"/>
               </a:rPr>
-              <a:t>Comprehension syntax is syntactic sugar </a:t>
-            </a:r>
-            <a:r>
-              <a:rPr lang="en-US" sz="2000" b="0" i="1" u="none" strike="noStrike" kern="1200" spc="0" dirty="0" smtClean="0">
-                <a:ln>
-                  <a:noFill/>
-                </a:ln>
-                <a:latin typeface="Arial" pitchFamily="18"/>
-                <a:ea typeface="DejaVu Sans" pitchFamily="2"/>
-                <a:cs typeface="DejaVu Sans" pitchFamily="2"/>
-              </a:rPr>
-              <a:t>on functions and lambdas</a:t>
+              <a:t>Comprehension syntax is syntactic sugar on functions and lambdas</a:t>
             </a:r>
             <a:endParaRPr lang="en-US" sz="2000" b="0" i="1" u="none" strike="noStrike" kern="1200" spc="0" dirty="0">
               <a:ln>
@@ -8324,16 +8251,11 @@
               <a:rPr lang="en-US" dirty="0" smtClean="0"/>
               <a:t>Training / Abstraction level</a:t>
             </a:r>
-            <a:endParaRPr lang="en-US" dirty="0" smtClean="0"/>
           </a:p>
           <a:p>
             <a:r>
               <a:rPr lang="en-US" dirty="0" smtClean="0"/>
-              <a:t>No </a:t>
-            </a:r>
-            <a:r>
-              <a:rPr lang="en-US" dirty="0" smtClean="0"/>
-              <a:t>multiparadigm</a:t>
+              <a:t>No multiparadigm</a:t>
             </a:r>
           </a:p>
           <a:p>
@@ -8341,7 +8263,6 @@
               <a:rPr lang="en-US" dirty="0" smtClean="0"/>
               <a:t>Performance of duck typing</a:t>
             </a:r>
-            <a:endParaRPr lang="en-US" dirty="0" smtClean="0"/>
           </a:p>
         </p:txBody>
       </p:sp>
@@ -8768,11 +8689,7 @@
           <a:p>
             <a:r>
               <a:rPr lang="en-US" dirty="0" smtClean="0"/>
-              <a:t>Visual Studio </a:t>
-            </a:r>
-            <a:r>
-              <a:rPr lang="en-US" dirty="0" smtClean="0"/>
-              <a:t>support</a:t>
+              <a:t>Visual Studio support</a:t>
             </a:r>
           </a:p>
           <a:p>
@@ -8781,18 +8698,12 @@
               <a:rPr lang="en-US" dirty="0" smtClean="0"/>
               <a:t>Mostly…</a:t>
             </a:r>
-            <a:endParaRPr lang="en-US" dirty="0" smtClean="0"/>
           </a:p>
           <a:p>
             <a:r>
               <a:rPr lang="en-US" dirty="0" smtClean="0"/>
-              <a:t>Multiparadigm( FP / </a:t>
-            </a:r>
-            <a:r>
-              <a:rPr lang="en-US" dirty="0" smtClean="0"/>
-              <a:t>OO )</a:t>
-            </a:r>
-            <a:endParaRPr lang="en-US" dirty="0" smtClean="0"/>
+              <a:t>Multiparadigm( FP / OO )</a:t>
+            </a:r>
           </a:p>
           <a:p>
             <a:r>
@@ -9806,27 +9717,8 @@
                 <a:ea typeface="DejaVu Sans" pitchFamily="2"/>
                 <a:cs typeface="DejaVu Sans" pitchFamily="2"/>
               </a:rPr>
-              <a:t>*classes, interfaces, functions, </a:t>
-            </a:r>
-            <a:r>
-              <a:rPr lang="en-US" b="0" i="0" u="none" strike="noStrike" kern="1200" spc="0" dirty="0" smtClean="0">
-                <a:ln>
-                  <a:noFill/>
-                </a:ln>
-                <a:latin typeface="Arial" pitchFamily="18"/>
-                <a:ea typeface="DejaVu Sans" pitchFamily="2"/>
-                <a:cs typeface="DejaVu Sans" pitchFamily="2"/>
-              </a:rPr>
-              <a:t>etc.</a:t>
-            </a:r>
-            <a:endParaRPr lang="en-US" b="0" i="0" u="none" strike="noStrike" kern="1200" spc="0" dirty="0" smtClean="0">
-              <a:ln>
-                <a:noFill/>
-              </a:ln>
-              <a:latin typeface="Arial" pitchFamily="18"/>
-              <a:ea typeface="DejaVu Sans" pitchFamily="2"/>
-              <a:cs typeface="DejaVu Sans" pitchFamily="2"/>
-            </a:endParaRPr>
+              <a:t>*classes, interfaces, functions, etc.</a:t>
+            </a:r>
           </a:p>
           <a:p>
             <a:pPr marL="342900" marR="0" lvl="0" indent="-342900" rtl="0" hangingPunct="0">
@@ -10517,19 +10409,7 @@
             </a:pPr>
             <a:r>
               <a:rPr lang="en-US" dirty="0" smtClean="0"/>
-              <a:t>SELECT, JOIN, WHERE</a:t>
-            </a:r>
-            <a:r>
-              <a:rPr lang="en-US" dirty="0" smtClean="0"/>
-              <a:t>, GROUP </a:t>
-            </a:r>
-            <a:r>
-              <a:rPr lang="en-US" dirty="0" smtClean="0"/>
-              <a:t>BY, </a:t>
-            </a:r>
-            <a:r>
-              <a:rPr lang="en-US" dirty="0" smtClean="0"/>
-              <a:t>SUM</a:t>
+              <a:t>SELECT, JOIN, WHERE, GROUP BY, SUM</a:t>
             </a:r>
           </a:p>
           <a:p>
@@ -10559,15 +10439,7 @@
             </a:pPr>
             <a:r>
               <a:rPr lang="en-US" dirty="0" smtClean="0"/>
-              <a:t>DECLARE CURSOR, TEMP TABLE, </a:t>
-            </a:r>
-            <a:r>
-              <a:rPr lang="en-US" dirty="0" smtClean="0"/>
-              <a:t>LOOPS, IF, ADDITION, </a:t>
-            </a:r>
-            <a:r>
-              <a:rPr lang="en-US" dirty="0" smtClean="0"/>
-              <a:t>AGGREGATION VARIABLES</a:t>
+              <a:t>DECLARE CURSOR, TEMP TABLE, LOOPS, IF, ADDITION, AGGREGATION VARIABLES</a:t>
             </a:r>
             <a:endParaRPr lang="en-US" dirty="0"/>
           </a:p>
@@ -10808,11 +10680,7 @@
             </a:pPr>
             <a:r>
               <a:rPr lang="en-US" dirty="0" smtClean="0"/>
-              <a:t>So why the second choice when writing </a:t>
-            </a:r>
-            <a:r>
-              <a:rPr lang="en-US" dirty="0" smtClean="0"/>
-              <a:t>in </a:t>
+              <a:t>So why the second choice when writing in </a:t>
             </a:r>
             <a:r>
               <a:rPr lang="en-US" dirty="0" err="1" smtClean="0"/>
@@ -11141,14 +11009,6 @@
               </a:rPr>
               <a:t>Object Oriented Programming</a:t>
             </a:r>
-            <a:endParaRPr lang="en-US" sz="2000" b="0" i="0" u="none" strike="noStrike" kern="1200" spc="0" dirty="0" smtClean="0">
-              <a:ln>
-                <a:noFill/>
-              </a:ln>
-              <a:latin typeface="Arial" pitchFamily="18"/>
-              <a:ea typeface="DejaVu Sans" pitchFamily="2"/>
-              <a:cs typeface="DejaVu Sans" pitchFamily="2"/>
-            </a:endParaRPr>
           </a:p>
           <a:p>
             <a:pPr marL="742950" lvl="1" indent="-285750" hangingPunct="0">
@@ -11208,8 +11068,14 @@
                 <a:ea typeface="DejaVu Sans" pitchFamily="2"/>
                 <a:cs typeface="DejaVu Sans" pitchFamily="2"/>
               </a:rPr>
-              <a:t>Functional </a:t>
-            </a:r>
+              <a:t>Functional programming</a:t>
+            </a:r>
+          </a:p>
+          <a:p>
+            <a:pPr marL="742950" lvl="1" indent="-285750" hangingPunct="0">
+              <a:buFont typeface="Arial" pitchFamily="34" charset="0"/>
+              <a:buChar char="•"/>
+            </a:pPr>
             <a:r>
               <a:rPr lang="en-US" sz="2000" b="0" i="0" u="none" strike="noStrike" kern="1200" spc="0" dirty="0" smtClean="0">
                 <a:ln>
@@ -11219,35 +11085,7 @@
                 <a:ea typeface="DejaVu Sans" pitchFamily="2"/>
                 <a:cs typeface="DejaVu Sans" pitchFamily="2"/>
               </a:rPr>
-              <a:t>programming</a:t>
-            </a:r>
-          </a:p>
-          <a:p>
-            <a:pPr marL="742950" lvl="1" indent="-285750" hangingPunct="0">
-              <a:buFont typeface="Arial" pitchFamily="34" charset="0"/>
-              <a:buChar char="•"/>
-            </a:pPr>
-            <a:r>
-              <a:rPr lang="en-US" sz="2000" b="0" i="0" u="none" strike="noStrike" kern="1200" spc="0" dirty="0" smtClean="0">
-                <a:ln>
-                  <a:noFill/>
-                </a:ln>
-                <a:latin typeface="Arial" pitchFamily="18"/>
-                <a:ea typeface="DejaVu Sans" pitchFamily="2"/>
-                <a:cs typeface="DejaVu Sans" pitchFamily="2"/>
-              </a:rPr>
-              <a:t>Does provide composable </a:t>
-            </a:r>
-            <a:r>
-              <a:rPr lang="en-US" sz="2000" b="0" i="0" u="none" strike="noStrike" kern="1200" spc="0" dirty="0" smtClean="0">
-                <a:ln>
-                  <a:noFill/>
-                </a:ln>
-                <a:latin typeface="Arial" pitchFamily="18"/>
-                <a:ea typeface="DejaVu Sans" pitchFamily="2"/>
-                <a:cs typeface="DejaVu Sans" pitchFamily="2"/>
-              </a:rPr>
-              <a:t>algorithms</a:t>
+              <a:t>Does provide composable algorithms</a:t>
             </a:r>
           </a:p>
           <a:p>
@@ -11291,49 +11129,8 @@
                 <a:ea typeface="DejaVu Sans" pitchFamily="2"/>
                 <a:cs typeface="DejaVu Sans" pitchFamily="2"/>
               </a:rPr>
-              <a:t>Enables </a:t>
-            </a:r>
-            <a:r>
-              <a:rPr lang="en-US" sz="2000" b="0" i="0" u="none" strike="noStrike" kern="1200" spc="0" dirty="0" smtClean="0">
-                <a:ln>
-                  <a:noFill/>
-                </a:ln>
-                <a:latin typeface="Arial" pitchFamily="18"/>
-                <a:ea typeface="DejaVu Sans" pitchFamily="2"/>
-                <a:cs typeface="DejaVu Sans" pitchFamily="2"/>
-              </a:rPr>
-              <a:t>composable FP </a:t>
-            </a:r>
-            <a:r>
-              <a:rPr lang="en-US" sz="2000" b="0" i="0" u="none" strike="noStrike" kern="1200" spc="0" dirty="0" smtClean="0">
-                <a:ln>
-                  <a:noFill/>
-                </a:ln>
-                <a:latin typeface="Arial" pitchFamily="18"/>
-                <a:ea typeface="DejaVu Sans" pitchFamily="2"/>
-                <a:cs typeface="DejaVu Sans" pitchFamily="2"/>
-              </a:rPr>
-              <a:t>and OO abstractions even when needing more concrete types than the abstraction knows about</a:t>
-            </a:r>
-            <a:r>
-              <a:rPr lang="en-US" sz="2000" b="0" i="0" u="none" strike="noStrike" kern="1200" spc="0" dirty="0" smtClean="0">
-                <a:ln>
-                  <a:noFill/>
-                </a:ln>
-                <a:latin typeface="Arial" pitchFamily="18"/>
-                <a:ea typeface="DejaVu Sans" pitchFamily="2"/>
-                <a:cs typeface="DejaVu Sans" pitchFamily="2"/>
-              </a:rPr>
-              <a:t>.</a:t>
-            </a:r>
-            <a:endParaRPr lang="en-US" sz="2000" b="0" i="0" u="none" strike="noStrike" kern="1200" spc="0" dirty="0" smtClean="0">
-              <a:ln>
-                <a:noFill/>
-              </a:ln>
-              <a:latin typeface="Arial" pitchFamily="18"/>
-              <a:ea typeface="DejaVu Sans" pitchFamily="2"/>
-              <a:cs typeface="DejaVu Sans" pitchFamily="2"/>
-            </a:endParaRPr>
+              <a:t>Enables composable FP and OO abstractions even when needing more concrete types than the abstraction knows about.</a:t>
+            </a:r>
           </a:p>
         </p:txBody>
       </p:sp>
@@ -11768,10 +11565,6 @@
             <a:r>
               <a:rPr lang="en-US" smtClean="0"/>
               <a:t>vs Functional</a:t>
-            </a:r>
-            <a:r>
-              <a:rPr lang="en-US" smtClean="0"/>
-              <a:t/>
             </a:r>
             <a:br>
               <a:rPr lang="en-US" smtClean="0"/>
@@ -13327,11 +13120,7 @@
             </a:pPr>
             <a:r>
               <a:rPr lang="en-US" dirty="0" smtClean="0"/>
-              <a:t>The </a:t>
-            </a:r>
-            <a:r>
-              <a:rPr lang="en-US" dirty="0" smtClean="0"/>
-              <a:t>free lunch is over</a:t>
+              <a:t>The free lunch is over</a:t>
             </a:r>
             <a:endParaRPr lang="en-US" dirty="0"/>
           </a:p>
@@ -13376,7 +13165,6 @@
               <a:rPr lang="en-US" dirty="0" smtClean="0"/>
               <a:t>Because developers fail to utilize modern computers</a:t>
             </a:r>
-            <a:endParaRPr lang="en-US" dirty="0" smtClean="0"/>
           </a:p>
         </p:txBody>
       </p:sp>

</xml_diff>